<commit_message>
Add meet me info to slides
</commit_message>
<xml_diff>
--- a/2024/0806_VSLiveRedmond/WindowsDevOptions/VSLMSHQ24_Building a Native Windows App_AlvinAshcraft.pptx
+++ b/2024/0806_VSLiveRedmond/WindowsDevOptions/VSLMSHQ24_Building a Native Windows App_AlvinAshcraft.pptx
@@ -2666,6 +2666,30 @@
           <a:p>
             <a:endParaRPr lang="en-US" dirty="0"/>
           </a:p>
+          <a:p>
+            <a:r>
+              <a:rPr lang="en-US" dirty="0"/>
+              <a:t>If you have questions or want to chat later, this is where you can find me this week. I’ll also have copies of my Learn </a:t>
+            </a:r>
+            <a:r>
+              <a:rPr lang="en-US" dirty="0" err="1"/>
+              <a:t>WinUI</a:t>
+            </a:r>
+            <a:r>
+              <a:rPr lang="en-US" dirty="0"/>
+              <a:t> 3 book to give away at the Tuesday and Thursday receptions. Find me at </a:t>
+            </a:r>
+            <a:r>
+              <a:rPr lang="en-US"/>
+              <a:t>the Microsoft Learn table.</a:t>
+            </a:r>
+          </a:p>
+          <a:p>
+            <a:endParaRPr lang="en-US" dirty="0"/>
+          </a:p>
+          <a:p>
+            <a:endParaRPr lang="en-US" dirty="0"/>
+          </a:p>
         </p:txBody>
       </p:sp>
     </p:spTree>
@@ -3956,7 +3980,7 @@
           <a:p>
             <a:fld id="{D088F999-7A4E-6B4F-9FED-EF75B73AD044}" type="datetimeFigureOut">
               <a:rPr lang="en-US" smtClean="0"/>
-              <a:t>7/13/2024</a:t>
+              <a:t>8/5/2024</a:t>
             </a:fld>
             <a:endParaRPr lang="en-US"/>
           </a:p>
@@ -4124,7 +4148,7 @@
           <a:p>
             <a:fld id="{D088F999-7A4E-6B4F-9FED-EF75B73AD044}" type="datetimeFigureOut">
               <a:rPr lang="en-US" smtClean="0"/>
-              <a:t>7/13/2024</a:t>
+              <a:t>8/5/2024</a:t>
             </a:fld>
             <a:endParaRPr lang="en-US"/>
           </a:p>
@@ -4302,7 +4326,7 @@
           <a:p>
             <a:fld id="{D088F999-7A4E-6B4F-9FED-EF75B73AD044}" type="datetimeFigureOut">
               <a:rPr lang="en-US" smtClean="0"/>
-              <a:t>7/13/2024</a:t>
+              <a:t>8/5/2024</a:t>
             </a:fld>
             <a:endParaRPr lang="en-US"/>
           </a:p>
@@ -4471,7 +4495,7 @@
             <a:fld id="{3FE51E94-D08C-431E-88FC-7EB62E529A19}" type="datetimeFigureOut">
               <a:rPr lang="en-US" smtClean="0"/>
               <a:pPr/>
-              <a:t>7/13/2024</a:t>
+              <a:t>8/5/2024</a:t>
             </a:fld>
             <a:endParaRPr lang="en-US"/>
           </a:p>
@@ -4640,7 +4664,7 @@
           <a:p>
             <a:fld id="{D088F999-7A4E-6B4F-9FED-EF75B73AD044}" type="datetimeFigureOut">
               <a:rPr lang="en-US" smtClean="0"/>
-              <a:t>7/13/2024</a:t>
+              <a:t>8/5/2024</a:t>
             </a:fld>
             <a:endParaRPr lang="en-US"/>
           </a:p>
@@ -4885,7 +4909,7 @@
           <a:p>
             <a:fld id="{D088F999-7A4E-6B4F-9FED-EF75B73AD044}" type="datetimeFigureOut">
               <a:rPr lang="en-US" smtClean="0"/>
-              <a:t>7/13/2024</a:t>
+              <a:t>8/5/2024</a:t>
             </a:fld>
             <a:endParaRPr lang="en-US"/>
           </a:p>
@@ -5170,7 +5194,7 @@
           <a:p>
             <a:fld id="{D088F999-7A4E-6B4F-9FED-EF75B73AD044}" type="datetimeFigureOut">
               <a:rPr lang="en-US" smtClean="0"/>
-              <a:t>7/13/2024</a:t>
+              <a:t>8/5/2024</a:t>
             </a:fld>
             <a:endParaRPr lang="en-US"/>
           </a:p>
@@ -5589,7 +5613,7 @@
           <a:p>
             <a:fld id="{D088F999-7A4E-6B4F-9FED-EF75B73AD044}" type="datetimeFigureOut">
               <a:rPr lang="en-US" smtClean="0"/>
-              <a:t>7/13/2024</a:t>
+              <a:t>8/5/2024</a:t>
             </a:fld>
             <a:endParaRPr lang="en-US"/>
           </a:p>
@@ -5706,7 +5730,7 @@
           <a:p>
             <a:fld id="{D088F999-7A4E-6B4F-9FED-EF75B73AD044}" type="datetimeFigureOut">
               <a:rPr lang="en-US" smtClean="0"/>
-              <a:t>7/13/2024</a:t>
+              <a:t>8/5/2024</a:t>
             </a:fld>
             <a:endParaRPr lang="en-US"/>
           </a:p>
@@ -5801,7 +5825,7 @@
           <a:p>
             <a:fld id="{D088F999-7A4E-6B4F-9FED-EF75B73AD044}" type="datetimeFigureOut">
               <a:rPr lang="en-US" smtClean="0"/>
-              <a:t>7/13/2024</a:t>
+              <a:t>8/5/2024</a:t>
             </a:fld>
             <a:endParaRPr lang="en-US"/>
           </a:p>
@@ -6076,7 +6100,7 @@
           <a:p>
             <a:fld id="{D088F999-7A4E-6B4F-9FED-EF75B73AD044}" type="datetimeFigureOut">
               <a:rPr lang="en-US" smtClean="0"/>
-              <a:t>7/13/2024</a:t>
+              <a:t>8/5/2024</a:t>
             </a:fld>
             <a:endParaRPr lang="en-US"/>
           </a:p>
@@ -6328,7 +6352,7 @@
           <a:p>
             <a:fld id="{D088F999-7A4E-6B4F-9FED-EF75B73AD044}" type="datetimeFigureOut">
               <a:rPr lang="en-US" smtClean="0"/>
-              <a:t>7/13/2024</a:t>
+              <a:t>8/5/2024</a:t>
             </a:fld>
             <a:endParaRPr lang="en-US"/>
           </a:p>
@@ -6548,7 +6572,7 @@
           <a:p>
             <a:fld id="{D088F999-7A4E-6B4F-9FED-EF75B73AD044}" type="datetimeFigureOut">
               <a:rPr lang="en-US" smtClean="0"/>
-              <a:t>7/13/2024</a:t>
+              <a:t>8/5/2024</a:t>
             </a:fld>
             <a:endParaRPr lang="en-US"/>
           </a:p>
@@ -7065,7 +7089,7 @@
           <a:p>
             <a:fld id="{D088F999-7A4E-6B4F-9FED-EF75B73AD044}" type="datetimeFigureOut">
               <a:rPr lang="en-US" smtClean="0"/>
-              <a:t>7/13/2024</a:t>
+              <a:t>8/5/2024</a:t>
             </a:fld>
             <a:endParaRPr lang="en-US"/>
           </a:p>
@@ -10522,7 +10546,9 @@
         </p:nvSpPr>
         <p:spPr/>
         <p:txBody>
-          <a:bodyPr/>
+          <a:bodyPr>
+            <a:normAutofit fontScale="92500" lnSpcReduction="10000"/>
+          </a:bodyPr>
           <a:lstStyle/>
           <a:p>
             <a:r>
@@ -10541,9 +10567,33 @@
               </a:rPr>
               <a:t>alashcraft@gmail.com</a:t>
             </a:r>
-            <a:r>
-              <a:rPr lang="en-US" dirty="0"/>
-              <a:t> </a:t>
+            <a:endParaRPr lang="en-US" dirty="0"/>
+          </a:p>
+          <a:p>
+            <a:r>
+              <a:rPr lang="en-US" dirty="0"/>
+              <a:t>Meet me this week:</a:t>
+            </a:r>
+          </a:p>
+          <a:p>
+            <a:pPr lvl="1"/>
+            <a:r>
+              <a:rPr lang="en-US" dirty="0"/>
+              <a:t>Tue: Welcome Reception – MS Learn table</a:t>
+            </a:r>
+          </a:p>
+          <a:p>
+            <a:pPr lvl="1"/>
+            <a:r>
+              <a:rPr lang="en-US" dirty="0"/>
+              <a:t>Wed: Table Topics Lunch</a:t>
+            </a:r>
+          </a:p>
+          <a:p>
+            <a:pPr lvl="1"/>
+            <a:r>
+              <a:rPr lang="en-US" dirty="0"/>
+              <a:t>Thu: Meet the VS &amp; .NET Team Reception – MS Learn table </a:t>
             </a:r>
           </a:p>
         </p:txBody>

</xml_diff>

<commit_message>
Updates with Build info
</commit_message>
<xml_diff>
--- a/2024/0806_VSLiveRedmond/WindowsDevOptions/VSLMSHQ24_Building a Native Windows App_AlvinAshcraft.pptx
+++ b/2024/0806_VSLiveRedmond/WindowsDevOptions/VSLMSHQ24_Building a Native Windows App_AlvinAshcraft.pptx
@@ -1122,6 +1122,23 @@
           <a:p>
             <a:r>
               <a:rPr lang="en-US" dirty="0"/>
+              <a:t>1.6 will lay the groundwork for some new controls coming in 1.7 including Inking controls, </a:t>
+            </a:r>
+            <a:r>
+              <a:rPr lang="en-US" dirty="0" err="1"/>
+              <a:t>TableView</a:t>
+            </a:r>
+            <a:r>
+              <a:rPr lang="en-US" dirty="0"/>
+              <a:t>, and cross-process Islands. It’s also bringing C# Native AOT (ahead-of-time compiling) for faster startup times and smaller memory footprints.</a:t>
+            </a:r>
+          </a:p>
+          <a:p>
+            <a:endParaRPr lang="en-US" dirty="0"/>
+          </a:p>
+          <a:p>
+            <a:r>
+              <a:rPr lang="en-US" dirty="0"/>
               <a:t>You can check out the current Windows App SDK roadmap on GitHub.</a:t>
             </a:r>
           </a:p>
@@ -2365,7 +2382,15 @@
             </a:r>
             <a:r>
               <a:rPr lang="en-US" dirty="0"/>
-              <a:t> and Windows App SDK has the features you need, you should choose that. From the Windows team’s perspective, it’s the hero framework moving forward. If it doesn’t have what you need, look at WPF. WPF is also great for building complex, enterprise apps. It’s still getting new features and is not going anywhere.</a:t>
+              <a:t> and Windows App SDK has the features you need, you should choose that. From the Windows team’s perspective, it’s the hero framework moving forward. If it doesn’t have what you need, look at WPF. WPF is also great for building complex, enterprise apps with multiple Windows. If you’re modernizing an existing WPF app, WPF </a:t>
+            </a:r>
+            <a:r>
+              <a:rPr lang="en-US"/>
+              <a:t>with .NET 8 or 9 </a:t>
+            </a:r>
+            <a:r>
+              <a:rPr lang="en-US" dirty="0"/>
+              <a:t>is probably your best choice. It’s still getting new features and is not going anywhere.</a:t>
             </a:r>
           </a:p>
           <a:p>
@@ -2677,11 +2702,7 @@
             </a:r>
             <a:r>
               <a:rPr lang="en-US" dirty="0"/>
-              <a:t> 3 book to give away at the Tuesday and Thursday receptions. Find me at </a:t>
-            </a:r>
-            <a:r>
-              <a:rPr lang="en-US"/>
-              <a:t>the Microsoft Learn table.</a:t>
+              <a:t> 3 book to give away at the Tuesday and Thursday receptions. Find me at the Microsoft Learn table.</a:t>
             </a:r>
           </a:p>
           <a:p>
@@ -8680,6 +8701,21 @@
             <a:pPr lvl="1"/>
             <a:r>
               <a:rPr lang="en-US" dirty="0"/>
+              <a:t>1.6 – C# Native AOT; improvements to </a:t>
+            </a:r>
+            <a:r>
+              <a:rPr lang="en-US" dirty="0" err="1"/>
+              <a:t>TitleBar</a:t>
+            </a:r>
+            <a:r>
+              <a:rPr lang="en-US" dirty="0"/>
+              <a:t>, x:Bind &amp; IntelliSense; work for 1.7 controls</a:t>
+            </a:r>
+          </a:p>
+          <a:p>
+            <a:pPr lvl="1"/>
+            <a:r>
+              <a:rPr lang="en-US" dirty="0"/>
               <a:t>Roadmap: </a:t>
             </a:r>
             <a:r>
@@ -8696,13 +8732,19 @@
           <a:p>
             <a:r>
               <a:rPr lang="en-US" dirty="0"/>
+              <a:t>C# and C++ support on x64, x86 and Arm64</a:t>
+            </a:r>
+          </a:p>
+          <a:p>
+            <a:r>
+              <a:rPr lang="en-US" dirty="0"/>
               <a:t>Rich data binding with MVVM</a:t>
             </a:r>
           </a:p>
           <a:p>
             <a:r>
               <a:rPr lang="en-US" dirty="0"/>
-              <a:t>Great for Touch and Pen input</a:t>
+              <a:t>Great for modern experiences and hardware - Touch and Pen input</a:t>
             </a:r>
           </a:p>
           <a:p>
@@ -8714,7 +8756,7 @@
           <a:p>
             <a:r>
               <a:rPr lang="en-US" dirty="0"/>
-              <a:t>Positioned as the top choice to build native Windows apps</a:t>
+              <a:t>Positioned as the top choice to build modern native Windows apps</a:t>
             </a:r>
           </a:p>
           <a:p>
@@ -10255,6 +10297,66 @@
           </a:p>
         </p:txBody>
       </p:sp>
+      <p:pic>
+        <p:nvPicPr>
+          <p:cNvPr id="5" name="Picture 4">
+            <a:extLst>
+              <a:ext uri="{FF2B5EF4-FFF2-40B4-BE49-F238E27FC236}">
+                <a16:creationId xmlns:a16="http://schemas.microsoft.com/office/drawing/2014/main" id="{D302BA91-E6FC-57B3-2F8E-EB264E4D8983}"/>
+              </a:ext>
+            </a:extLst>
+          </p:cNvPr>
+          <p:cNvPicPr>
+            <a:picLocks noChangeAspect="1"/>
+          </p:cNvPicPr>
+          <p:nvPr/>
+        </p:nvPicPr>
+        <p:blipFill>
+          <a:blip r:embed="rId3"/>
+          <a:stretch>
+            <a:fillRect/>
+          </a:stretch>
+        </p:blipFill>
+        <p:spPr>
+          <a:xfrm>
+            <a:off x="5391666" y="1047750"/>
+            <a:ext cx="3385751" cy="1828800"/>
+          </a:xfrm>
+          <a:prstGeom prst="rect">
+            <a:avLst/>
+          </a:prstGeom>
+        </p:spPr>
+      </p:pic>
+      <p:pic>
+        <p:nvPicPr>
+          <p:cNvPr id="7" name="Picture 6">
+            <a:extLst>
+              <a:ext uri="{FF2B5EF4-FFF2-40B4-BE49-F238E27FC236}">
+                <a16:creationId xmlns:a16="http://schemas.microsoft.com/office/drawing/2014/main" id="{8C38EEA6-A8B8-978D-C3DC-FF625068C416}"/>
+              </a:ext>
+            </a:extLst>
+          </p:cNvPr>
+          <p:cNvPicPr>
+            <a:picLocks noChangeAspect="1"/>
+          </p:cNvPicPr>
+          <p:nvPr/>
+        </p:nvPicPr>
+        <p:blipFill>
+          <a:blip r:embed="rId4"/>
+          <a:stretch>
+            <a:fillRect/>
+          </a:stretch>
+        </p:blipFill>
+        <p:spPr>
+          <a:xfrm>
+            <a:off x="5391665" y="2943029"/>
+            <a:ext cx="3385751" cy="1651196"/>
+          </a:xfrm>
+          <a:prstGeom prst="rect">
+            <a:avLst/>
+          </a:prstGeom>
+        </p:spPr>
+      </p:pic>
     </p:spTree>
     <p:extLst>
       <p:ext uri="{BB962C8B-B14F-4D97-AF65-F5344CB8AC3E}">
@@ -10332,28 +10434,28 @@
         <p:spPr>
           <a:xfrm>
             <a:off x="457200" y="1123950"/>
-            <a:ext cx="8458200" cy="3581400"/>
+            <a:ext cx="8458200" cy="3657600"/>
           </a:xfrm>
         </p:spPr>
         <p:txBody>
           <a:bodyPr>
-            <a:normAutofit fontScale="62500" lnSpcReduction="20000"/>
+            <a:normAutofit fontScale="55000" lnSpcReduction="20000"/>
           </a:bodyPr>
           <a:lstStyle/>
           <a:p>
             <a:r>
               <a:rPr lang="en-US" dirty="0"/>
-              <a:t>Windows App Development – Options &amp; Features: </a:t>
+              <a:t>Choose the best UI framework – Microsoft Learn Training module: </a:t>
             </a:r>
             <a:r>
               <a:rPr lang="en-US" dirty="0">
                 <a:hlinkClick r:id="rId3"/>
               </a:rPr>
-              <a:t>https://learn.microsoft.com/windows/apps/get-started/dev-options</a:t>
-            </a:r>
-            <a:r>
-              <a:rPr lang="en-US" dirty="0"/>
-              <a:t> </a:t>
+              <a:t>https://learn.microsoft.com/training/modules/windows-choose-best-app-framework/</a:t>
+            </a:r>
+            <a:r>
+              <a:rPr lang="en-US" dirty="0"/>
+              <a:t>  </a:t>
             </a:r>
           </a:p>
           <a:p>
@@ -10455,7 +10557,7 @@
           <a:p>
             <a:r>
               <a:rPr lang="en-US" dirty="0"/>
-              <a:t>My sessions on GitHub: </a:t>
+              <a:t>My session materials on GitHub: </a:t>
             </a:r>
             <a:r>
               <a:rPr lang="en-US" dirty="0">
@@ -11946,7 +12048,7 @@
           <a:p>
             <a:r>
               <a:rPr lang="en-US" dirty="0"/>
-              <a:t>3rd Party control and library support (Theming)</a:t>
+              <a:t>Extensive 3rd Party control and library support (Theming)</a:t>
             </a:r>
           </a:p>
           <a:p>
@@ -11982,7 +12084,7 @@
           <a:p>
             <a:r>
               <a:rPr lang="en-US" dirty="0"/>
-              <a:t>Positioned as a great choice to build native Enterprise apps</a:t>
+              <a:t>Great for native Enterprise apps with multi-window experiences</a:t>
             </a:r>
           </a:p>
         </p:txBody>

</xml_diff>